<commit_message>
Materials used for 'README.md'
</commit_message>
<xml_diff>
--- a/images/MAML.pptx
+++ b/images/MAML.pptx
@@ -11,6 +11,8 @@
     <p:sldId id="259" r:id="rId5"/>
     <p:sldId id="260" r:id="rId6"/>
     <p:sldId id="261" r:id="rId7"/>
+    <p:sldId id="262" r:id="rId8"/>
+    <p:sldId id="263" r:id="rId9"/>
   </p:sldIdLst>
   <p:sldSz cx="12192000" cy="6858000"/>
   <p:notesSz cx="6858000" cy="9144000"/>
@@ -109,7 +111,24 @@
       </a:defRPr>
     </a:lvl9pPr>
   </p:defaultTextStyle>
+  <p:extLst>
+    <p:ext uri="{EFAFB233-063F-42B5-8137-9DF3F51BA10A}">
+      <p15:sldGuideLst xmlns:p15="http://schemas.microsoft.com/office/powerpoint/2012/main"/>
+    </p:ext>
+  </p:extLst>
 </p:presentation>
+</file>
+
+<file path=ppt/commentAuthors.xml><?xml version="1.0" encoding="utf-8"?>
+<p:cmAuthorLst xmlns:a="http://schemas.openxmlformats.org/drawingml/2006/main" xmlns:r="http://schemas.openxmlformats.org/officeDocument/2006/relationships" xmlns:p="http://schemas.openxmlformats.org/presentationml/2006/main">
+  <p:cmAuthor id="1" name="조상연(학부생-소프트웨어전공)" initials="조소" lastIdx="1" clrIdx="0">
+    <p:extLst>
+      <p:ext uri="{19B8F6BF-5375-455C-9EA6-DF929625EA0E}">
+        <p15:presenceInfo xmlns:p15="http://schemas.microsoft.com/office/powerpoint/2012/main" userId="S::whtkddus98@kookmin.kr::6d1b2f83-e3f8-493d-8161-dc07009781fd" providerId="AD"/>
+      </p:ext>
+    </p:extLst>
+  </p:cmAuthor>
+</p:cmAuthorLst>
 </file>
 
 <file path=ppt/slideLayouts/slideLayout1.xml><?xml version="1.0" encoding="utf-8"?>
@@ -259,7 +278,7 @@
           <a:p>
             <a:fld id="{DAA45A8E-2A8B-48C9-ADBF-9A9D3A6112B3}" type="datetimeFigureOut">
               <a:rPr lang="ko-KR" altLang="en-US" smtClean="0"/>
-              <a:t>2022-06-05</a:t>
+              <a:t>2022-06-06</a:t>
             </a:fld>
             <a:endParaRPr lang="ko-KR" altLang="en-US"/>
           </a:p>
@@ -457,7 +476,7 @@
           <a:p>
             <a:fld id="{DAA45A8E-2A8B-48C9-ADBF-9A9D3A6112B3}" type="datetimeFigureOut">
               <a:rPr lang="ko-KR" altLang="en-US" smtClean="0"/>
-              <a:t>2022-06-05</a:t>
+              <a:t>2022-06-06</a:t>
             </a:fld>
             <a:endParaRPr lang="ko-KR" altLang="en-US"/>
           </a:p>
@@ -665,7 +684,7 @@
           <a:p>
             <a:fld id="{DAA45A8E-2A8B-48C9-ADBF-9A9D3A6112B3}" type="datetimeFigureOut">
               <a:rPr lang="ko-KR" altLang="en-US" smtClean="0"/>
-              <a:t>2022-06-05</a:t>
+              <a:t>2022-06-06</a:t>
             </a:fld>
             <a:endParaRPr lang="ko-KR" altLang="en-US"/>
           </a:p>
@@ -863,7 +882,7 @@
           <a:p>
             <a:fld id="{DAA45A8E-2A8B-48C9-ADBF-9A9D3A6112B3}" type="datetimeFigureOut">
               <a:rPr lang="ko-KR" altLang="en-US" smtClean="0"/>
-              <a:t>2022-06-05</a:t>
+              <a:t>2022-06-06</a:t>
             </a:fld>
             <a:endParaRPr lang="ko-KR" altLang="en-US"/>
           </a:p>
@@ -1138,7 +1157,7 @@
           <a:p>
             <a:fld id="{DAA45A8E-2A8B-48C9-ADBF-9A9D3A6112B3}" type="datetimeFigureOut">
               <a:rPr lang="ko-KR" altLang="en-US" smtClean="0"/>
-              <a:t>2022-06-05</a:t>
+              <a:t>2022-06-06</a:t>
             </a:fld>
             <a:endParaRPr lang="ko-KR" altLang="en-US"/>
           </a:p>
@@ -1403,7 +1422,7 @@
           <a:p>
             <a:fld id="{DAA45A8E-2A8B-48C9-ADBF-9A9D3A6112B3}" type="datetimeFigureOut">
               <a:rPr lang="ko-KR" altLang="en-US" smtClean="0"/>
-              <a:t>2022-06-05</a:t>
+              <a:t>2022-06-06</a:t>
             </a:fld>
             <a:endParaRPr lang="ko-KR" altLang="en-US"/>
           </a:p>
@@ -1815,7 +1834,7 @@
           <a:p>
             <a:fld id="{DAA45A8E-2A8B-48C9-ADBF-9A9D3A6112B3}" type="datetimeFigureOut">
               <a:rPr lang="ko-KR" altLang="en-US" smtClean="0"/>
-              <a:t>2022-06-05</a:t>
+              <a:t>2022-06-06</a:t>
             </a:fld>
             <a:endParaRPr lang="ko-KR" altLang="en-US"/>
           </a:p>
@@ -1956,7 +1975,7 @@
           <a:p>
             <a:fld id="{DAA45A8E-2A8B-48C9-ADBF-9A9D3A6112B3}" type="datetimeFigureOut">
               <a:rPr lang="ko-KR" altLang="en-US" smtClean="0"/>
-              <a:t>2022-06-05</a:t>
+              <a:t>2022-06-06</a:t>
             </a:fld>
             <a:endParaRPr lang="ko-KR" altLang="en-US"/>
           </a:p>
@@ -2069,7 +2088,7 @@
           <a:p>
             <a:fld id="{DAA45A8E-2A8B-48C9-ADBF-9A9D3A6112B3}" type="datetimeFigureOut">
               <a:rPr lang="ko-KR" altLang="en-US" smtClean="0"/>
-              <a:t>2022-06-05</a:t>
+              <a:t>2022-06-06</a:t>
             </a:fld>
             <a:endParaRPr lang="ko-KR" altLang="en-US"/>
           </a:p>
@@ -2380,7 +2399,7 @@
           <a:p>
             <a:fld id="{DAA45A8E-2A8B-48C9-ADBF-9A9D3A6112B3}" type="datetimeFigureOut">
               <a:rPr lang="ko-KR" altLang="en-US" smtClean="0"/>
-              <a:t>2022-06-05</a:t>
+              <a:t>2022-06-06</a:t>
             </a:fld>
             <a:endParaRPr lang="ko-KR" altLang="en-US"/>
           </a:p>
@@ -2668,7 +2687,7 @@
           <a:p>
             <a:fld id="{DAA45A8E-2A8B-48C9-ADBF-9A9D3A6112B3}" type="datetimeFigureOut">
               <a:rPr lang="ko-KR" altLang="en-US" smtClean="0"/>
-              <a:t>2022-06-05</a:t>
+              <a:t>2022-06-06</a:t>
             </a:fld>
             <a:endParaRPr lang="ko-KR" altLang="en-US"/>
           </a:p>
@@ -2909,7 +2928,7 @@
           <a:p>
             <a:fld id="{DAA45A8E-2A8B-48C9-ADBF-9A9D3A6112B3}" type="datetimeFigureOut">
               <a:rPr lang="ko-KR" altLang="en-US" smtClean="0"/>
-              <a:t>2022-06-05</a:t>
+              <a:t>2022-06-06</a:t>
             </a:fld>
             <a:endParaRPr lang="ko-KR" altLang="en-US"/>
           </a:p>
@@ -5841,6 +5860,316 @@
 </p:sld>
 </file>
 
+<file path=ppt/slides/slide7.xml><?xml version="1.0" encoding="utf-8"?>
+<p:sld xmlns:a="http://schemas.openxmlformats.org/drawingml/2006/main" xmlns:r="http://schemas.openxmlformats.org/officeDocument/2006/relationships" xmlns:p="http://schemas.openxmlformats.org/presentationml/2006/main">
+  <p:cSld>
+    <p:spTree>
+      <p:nvGrpSpPr>
+        <p:cNvPr id="1" name=""/>
+        <p:cNvGrpSpPr/>
+        <p:nvPr/>
+      </p:nvGrpSpPr>
+      <p:grpSpPr>
+        <a:xfrm>
+          <a:off x="0" y="0"/>
+          <a:ext cx="0" cy="0"/>
+          <a:chOff x="0" y="0"/>
+          <a:chExt cx="0" cy="0"/>
+        </a:xfrm>
+      </p:grpSpPr>
+      <p:grpSp>
+        <p:nvGrpSpPr>
+          <p:cNvPr id="5" name="그룹 4">
+            <a:extLst>
+              <a:ext uri="{FF2B5EF4-FFF2-40B4-BE49-F238E27FC236}">
+                <a16:creationId xmlns:a16="http://schemas.microsoft.com/office/drawing/2014/main" id="{C02FD371-C2F1-4D53-847D-8381164B689B}"/>
+              </a:ext>
+            </a:extLst>
+          </p:cNvPr>
+          <p:cNvGrpSpPr/>
+          <p:nvPr/>
+        </p:nvGrpSpPr>
+        <p:grpSpPr>
+          <a:xfrm>
+            <a:off x="1924050" y="76200"/>
+            <a:ext cx="8343900" cy="6705600"/>
+            <a:chOff x="2485159" y="72737"/>
+            <a:chExt cx="8343900" cy="6705600"/>
+          </a:xfrm>
+        </p:grpSpPr>
+        <p:pic>
+          <p:nvPicPr>
+            <p:cNvPr id="1026" name="Picture 2">
+              <a:extLst>
+                <a:ext uri="{FF2B5EF4-FFF2-40B4-BE49-F238E27FC236}">
+                  <a16:creationId xmlns:a16="http://schemas.microsoft.com/office/drawing/2014/main" id="{168CCEA3-3D05-466D-B05F-0805F499699A}"/>
+                </a:ext>
+              </a:extLst>
+            </p:cNvPr>
+            <p:cNvPicPr>
+              <a:picLocks noChangeAspect="1" noChangeArrowheads="1"/>
+            </p:cNvPicPr>
+            <p:nvPr/>
+          </p:nvPicPr>
+          <p:blipFill>
+            <a:blip r:embed="rId2">
+              <a:extLst>
+                <a:ext uri="{28A0092B-C50C-407E-A947-70E740481C1C}">
+                  <a14:useLocalDpi xmlns:a14="http://schemas.microsoft.com/office/drawing/2010/main" val="0"/>
+                </a:ext>
+              </a:extLst>
+            </a:blip>
+            <a:srcRect/>
+            <a:stretch>
+              <a:fillRect/>
+            </a:stretch>
+          </p:blipFill>
+          <p:spPr bwMode="auto">
+            <a:xfrm>
+              <a:off x="2485159" y="72737"/>
+              <a:ext cx="8343900" cy="3276600"/>
+            </a:xfrm>
+            <a:prstGeom prst="rect">
+              <a:avLst/>
+            </a:prstGeom>
+            <a:noFill/>
+            <a:ln>
+              <a:solidFill>
+                <a:schemeClr val="tx1"/>
+              </a:solidFill>
+            </a:ln>
+            <a:extLst>
+              <a:ext uri="{909E8E84-426E-40DD-AFC4-6F175D3DCCD1}">
+                <a14:hiddenFill xmlns:a14="http://schemas.microsoft.com/office/drawing/2010/main">
+                  <a:solidFill>
+                    <a:srgbClr val="FFFFFF"/>
+                  </a:solidFill>
+                </a14:hiddenFill>
+              </a:ext>
+            </a:extLst>
+          </p:spPr>
+        </p:pic>
+        <p:pic>
+          <p:nvPicPr>
+            <p:cNvPr id="1028" name="Picture 4">
+              <a:extLst>
+                <a:ext uri="{FF2B5EF4-FFF2-40B4-BE49-F238E27FC236}">
+                  <a16:creationId xmlns:a16="http://schemas.microsoft.com/office/drawing/2014/main" id="{C1E6EC37-F030-47AC-85F0-AEC38DDCD468}"/>
+                </a:ext>
+              </a:extLst>
+            </p:cNvPr>
+            <p:cNvPicPr>
+              <a:picLocks noChangeAspect="1" noChangeArrowheads="1"/>
+            </p:cNvPicPr>
+            <p:nvPr/>
+          </p:nvPicPr>
+          <p:blipFill>
+            <a:blip r:embed="rId3">
+              <a:extLst>
+                <a:ext uri="{28A0092B-C50C-407E-A947-70E740481C1C}">
+                  <a14:useLocalDpi xmlns:a14="http://schemas.microsoft.com/office/drawing/2010/main" val="0"/>
+                </a:ext>
+              </a:extLst>
+            </a:blip>
+            <a:srcRect/>
+            <a:stretch>
+              <a:fillRect/>
+            </a:stretch>
+          </p:blipFill>
+          <p:spPr bwMode="auto">
+            <a:xfrm>
+              <a:off x="2485159" y="3501737"/>
+              <a:ext cx="8343900" cy="3276600"/>
+            </a:xfrm>
+            <a:prstGeom prst="rect">
+              <a:avLst/>
+            </a:prstGeom>
+            <a:noFill/>
+            <a:ln>
+              <a:solidFill>
+                <a:schemeClr val="tx1"/>
+              </a:solidFill>
+            </a:ln>
+            <a:extLst>
+              <a:ext uri="{909E8E84-426E-40DD-AFC4-6F175D3DCCD1}">
+                <a14:hiddenFill xmlns:a14="http://schemas.microsoft.com/office/drawing/2010/main">
+                  <a:solidFill>
+                    <a:srgbClr val="FFFFFF"/>
+                  </a:solidFill>
+                </a14:hiddenFill>
+              </a:ext>
+            </a:extLst>
+          </p:spPr>
+        </p:pic>
+      </p:grpSp>
+    </p:spTree>
+    <p:extLst>
+      <p:ext uri="{BB962C8B-B14F-4D97-AF65-F5344CB8AC3E}">
+        <p14:creationId xmlns:p14="http://schemas.microsoft.com/office/powerpoint/2010/main" val="2904572785"/>
+      </p:ext>
+    </p:extLst>
+  </p:cSld>
+  <p:clrMapOvr>
+    <a:masterClrMapping/>
+  </p:clrMapOvr>
+</p:sld>
+</file>
+
+<file path=ppt/slides/slide8.xml><?xml version="1.0" encoding="utf-8"?>
+<p:sld xmlns:a="http://schemas.openxmlformats.org/drawingml/2006/main" xmlns:r="http://schemas.openxmlformats.org/officeDocument/2006/relationships" xmlns:p="http://schemas.openxmlformats.org/presentationml/2006/main">
+  <p:cSld>
+    <p:spTree>
+      <p:nvGrpSpPr>
+        <p:cNvPr id="1" name=""/>
+        <p:cNvGrpSpPr/>
+        <p:nvPr/>
+      </p:nvGrpSpPr>
+      <p:grpSpPr>
+        <a:xfrm>
+          <a:off x="0" y="0"/>
+          <a:ext cx="0" cy="0"/>
+          <a:chOff x="0" y="0"/>
+          <a:chExt cx="0" cy="0"/>
+        </a:xfrm>
+      </p:grpSpPr>
+      <p:grpSp>
+        <p:nvGrpSpPr>
+          <p:cNvPr id="4" name="그룹 3">
+            <a:extLst>
+              <a:ext uri="{FF2B5EF4-FFF2-40B4-BE49-F238E27FC236}">
+                <a16:creationId xmlns:a16="http://schemas.microsoft.com/office/drawing/2014/main" id="{FB2564CC-7447-472C-BC14-8D53E3ACC3BF}"/>
+              </a:ext>
+            </a:extLst>
+          </p:cNvPr>
+          <p:cNvGrpSpPr/>
+          <p:nvPr/>
+        </p:nvGrpSpPr>
+        <p:grpSpPr>
+          <a:xfrm>
+            <a:off x="1924050" y="76200"/>
+            <a:ext cx="8343900" cy="6705600"/>
+            <a:chOff x="1924050" y="0"/>
+            <a:chExt cx="8343900" cy="6705600"/>
+          </a:xfrm>
+        </p:grpSpPr>
+        <p:pic>
+          <p:nvPicPr>
+            <p:cNvPr id="2050" name="Picture 2">
+              <a:extLst>
+                <a:ext uri="{FF2B5EF4-FFF2-40B4-BE49-F238E27FC236}">
+                  <a16:creationId xmlns:a16="http://schemas.microsoft.com/office/drawing/2014/main" id="{E4FF4E4B-B827-42E1-9F46-10B666B2B814}"/>
+                </a:ext>
+              </a:extLst>
+            </p:cNvPr>
+            <p:cNvPicPr>
+              <a:picLocks noChangeAspect="1" noChangeArrowheads="1"/>
+            </p:cNvPicPr>
+            <p:nvPr/>
+          </p:nvPicPr>
+          <p:blipFill>
+            <a:blip r:embed="rId2">
+              <a:extLst>
+                <a:ext uri="{28A0092B-C50C-407E-A947-70E740481C1C}">
+                  <a14:useLocalDpi xmlns:a14="http://schemas.microsoft.com/office/drawing/2010/main" val="0"/>
+                </a:ext>
+              </a:extLst>
+            </a:blip>
+            <a:srcRect/>
+            <a:stretch>
+              <a:fillRect/>
+            </a:stretch>
+          </p:blipFill>
+          <p:spPr bwMode="auto">
+            <a:xfrm>
+              <a:off x="1924050" y="0"/>
+              <a:ext cx="8343900" cy="3276600"/>
+            </a:xfrm>
+            <a:prstGeom prst="rect">
+              <a:avLst/>
+            </a:prstGeom>
+            <a:noFill/>
+            <a:ln>
+              <a:solidFill>
+                <a:schemeClr val="tx1"/>
+              </a:solidFill>
+            </a:ln>
+            <a:extLst>
+              <a:ext uri="{909E8E84-426E-40DD-AFC4-6F175D3DCCD1}">
+                <a14:hiddenFill xmlns:a14="http://schemas.microsoft.com/office/drawing/2010/main">
+                  <a:solidFill>
+                    <a:srgbClr val="FFFFFF"/>
+                  </a:solidFill>
+                </a14:hiddenFill>
+              </a:ext>
+            </a:extLst>
+          </p:spPr>
+        </p:pic>
+        <p:pic>
+          <p:nvPicPr>
+            <p:cNvPr id="2052" name="Picture 4">
+              <a:extLst>
+                <a:ext uri="{FF2B5EF4-FFF2-40B4-BE49-F238E27FC236}">
+                  <a16:creationId xmlns:a16="http://schemas.microsoft.com/office/drawing/2014/main" id="{4422379B-1F9D-431E-9018-641A6B89D6CB}"/>
+                </a:ext>
+              </a:extLst>
+            </p:cNvPr>
+            <p:cNvPicPr>
+              <a:picLocks noChangeAspect="1" noChangeArrowheads="1"/>
+            </p:cNvPicPr>
+            <p:nvPr/>
+          </p:nvPicPr>
+          <p:blipFill>
+            <a:blip r:embed="rId3">
+              <a:extLst>
+                <a:ext uri="{28A0092B-C50C-407E-A947-70E740481C1C}">
+                  <a14:useLocalDpi xmlns:a14="http://schemas.microsoft.com/office/drawing/2010/main" val="0"/>
+                </a:ext>
+              </a:extLst>
+            </a:blip>
+            <a:srcRect/>
+            <a:stretch>
+              <a:fillRect/>
+            </a:stretch>
+          </p:blipFill>
+          <p:spPr bwMode="auto">
+            <a:xfrm>
+              <a:off x="1924050" y="3429000"/>
+              <a:ext cx="8343900" cy="3276600"/>
+            </a:xfrm>
+            <a:prstGeom prst="rect">
+              <a:avLst/>
+            </a:prstGeom>
+            <a:noFill/>
+            <a:ln>
+              <a:solidFill>
+                <a:schemeClr val="tx1"/>
+              </a:solidFill>
+            </a:ln>
+            <a:extLst>
+              <a:ext uri="{909E8E84-426E-40DD-AFC4-6F175D3DCCD1}">
+                <a14:hiddenFill xmlns:a14="http://schemas.microsoft.com/office/drawing/2010/main">
+                  <a:solidFill>
+                    <a:srgbClr val="FFFFFF"/>
+                  </a:solidFill>
+                </a14:hiddenFill>
+              </a:ext>
+            </a:extLst>
+          </p:spPr>
+        </p:pic>
+      </p:grpSp>
+    </p:spTree>
+    <p:extLst>
+      <p:ext uri="{BB962C8B-B14F-4D97-AF65-F5344CB8AC3E}">
+        <p14:creationId xmlns:p14="http://schemas.microsoft.com/office/powerpoint/2010/main" val="1683874562"/>
+      </p:ext>
+    </p:extLst>
+  </p:cSld>
+  <p:clrMapOvr>
+    <a:masterClrMapping/>
+  </p:clrMapOvr>
+</p:sld>
+</file>
+
 <file path=ppt/theme/theme1.xml><?xml version="1.0" encoding="utf-8"?>
 <a:theme xmlns:a="http://schemas.openxmlformats.org/drawingml/2006/main" name="Office 테마">
   <a:themeElements>

</xml_diff>